<commit_message>
inserindo botao de power. gitignore - ignorando as pastas log
</commit_message>
<xml_diff>
--- a/Controle_UsoDeEquipamento/imagens/imagens_v2.pptx
+++ b/Controle_UsoDeEquipamento/imagens/imagens_v2.pptx
@@ -244,7 +244,7 @@
           <a:p>
             <a:fld id="{FDE934FF-F4E1-47C5-9CA5-30A81DDE2BE4}" type="datetimeFigureOut">
               <a:rPr lang="en-US" smtClean="0"/>
-              <a:t>2/13/2019</a:t>
+              <a:t>10/30/2019</a:t>
             </a:fld>
             <a:endParaRPr lang="en-US"/>
           </a:p>
@@ -390,7 +390,7 @@
           <a:p>
             <a:fld id="{FDE934FF-F4E1-47C5-9CA5-30A81DDE2BE4}" type="datetimeFigureOut">
               <a:rPr lang="en-US" smtClean="0"/>
-              <a:t>2/13/2019</a:t>
+              <a:t>10/30/2019</a:t>
             </a:fld>
             <a:endParaRPr lang="en-US"/>
           </a:p>
@@ -553,7 +553,7 @@
           <a:p>
             <a:fld id="{FDE934FF-F4E1-47C5-9CA5-30A81DDE2BE4}" type="datetimeFigureOut">
               <a:rPr lang="en-US" smtClean="0"/>
-              <a:t>2/13/2019</a:t>
+              <a:t>10/30/2019</a:t>
             </a:fld>
             <a:endParaRPr lang="en-US"/>
           </a:p>
@@ -793,7 +793,7 @@
           <a:p>
             <a:fld id="{FDE934FF-F4E1-47C5-9CA5-30A81DDE2BE4}" type="datetimeFigureOut">
               <a:rPr lang="en-US" smtClean="0"/>
-              <a:t>2/13/2019</a:t>
+              <a:t>10/30/2019</a:t>
             </a:fld>
             <a:endParaRPr lang="en-US"/>
           </a:p>
@@ -1017,7 +1017,7 @@
           <a:p>
             <a:fld id="{FDE934FF-F4E1-47C5-9CA5-30A81DDE2BE4}" type="datetimeFigureOut">
               <a:rPr lang="en-US" smtClean="0"/>
-              <a:t>2/13/2019</a:t>
+              <a:t>10/30/2019</a:t>
             </a:fld>
             <a:endParaRPr lang="en-US"/>
           </a:p>
@@ -1376,7 +1376,7 @@
           <a:p>
             <a:fld id="{FDE934FF-F4E1-47C5-9CA5-30A81DDE2BE4}" type="datetimeFigureOut">
               <a:rPr lang="en-US" smtClean="0"/>
-              <a:t>2/13/2019</a:t>
+              <a:t>10/30/2019</a:t>
             </a:fld>
             <a:endParaRPr lang="en-US"/>
           </a:p>
@@ -1488,7 +1488,7 @@
           <a:p>
             <a:fld id="{FDE934FF-F4E1-47C5-9CA5-30A81DDE2BE4}" type="datetimeFigureOut">
               <a:rPr lang="en-US" smtClean="0"/>
-              <a:t>2/13/2019</a:t>
+              <a:t>10/30/2019</a:t>
             </a:fld>
             <a:endParaRPr lang="en-US"/>
           </a:p>
@@ -1578,7 +1578,7 @@
           <a:p>
             <a:fld id="{FDE934FF-F4E1-47C5-9CA5-30A81DDE2BE4}" type="datetimeFigureOut">
               <a:rPr lang="en-US" smtClean="0"/>
-              <a:t>2/13/2019</a:t>
+              <a:t>10/30/2019</a:t>
             </a:fld>
             <a:endParaRPr lang="en-US"/>
           </a:p>
@@ -1825,7 +1825,7 @@
           <a:p>
             <a:fld id="{FDE934FF-F4E1-47C5-9CA5-30A81DDE2BE4}" type="datetimeFigureOut">
               <a:rPr lang="en-US" smtClean="0"/>
-              <a:t>2/13/2019</a:t>
+              <a:t>10/30/2019</a:t>
             </a:fld>
             <a:endParaRPr lang="en-US"/>
           </a:p>
@@ -1998,7 +1998,7 @@
           <a:p>
             <a:fld id="{FDE934FF-F4E1-47C5-9CA5-30A81DDE2BE4}" type="datetimeFigureOut">
               <a:rPr lang="en-US" smtClean="0"/>
-              <a:t>2/13/2019</a:t>
+              <a:t>10/30/2019</a:t>
             </a:fld>
             <a:endParaRPr lang="en-US"/>
           </a:p>
@@ -2204,7 +2204,7 @@
           <a:p>
             <a:fld id="{FDE934FF-F4E1-47C5-9CA5-30A81DDE2BE4}" type="datetimeFigureOut">
               <a:rPr lang="en-US" smtClean="0"/>
-              <a:t>2/13/2019</a:t>
+              <a:t>10/30/2019</a:t>
             </a:fld>
             <a:endParaRPr lang="en-US"/>
           </a:p>
@@ -3225,9 +3225,9 @@
         <p:grpSpPr>
           <a:xfrm>
             <a:off x="2196882" y="2770505"/>
-            <a:ext cx="1735714" cy="2576711"/>
+            <a:ext cx="1789011" cy="2771005"/>
             <a:chOff x="1329055" y="1068705"/>
-            <a:chExt cx="3612572" cy="5362958"/>
+            <a:chExt cx="3723500" cy="5767346"/>
           </a:xfrm>
         </p:grpSpPr>
         <p:grpSp>
@@ -3245,9 +3245,9 @@
           <p:grpSpPr>
             <a:xfrm>
               <a:off x="1329055" y="1068705"/>
-              <a:ext cx="3612572" cy="5362958"/>
+              <a:ext cx="3723500" cy="5767346"/>
               <a:chOff x="1329055" y="1068705"/>
-              <a:chExt cx="3612572" cy="5362958"/>
+              <a:chExt cx="3723500" cy="5767346"/>
             </a:xfrm>
           </p:grpSpPr>
           <p:grpSp>
@@ -3265,9 +3265,9 @@
             <p:grpSpPr>
               <a:xfrm>
                 <a:off x="1329055" y="1068705"/>
-                <a:ext cx="3612572" cy="5362958"/>
+                <a:ext cx="3723500" cy="5767346"/>
                 <a:chOff x="1329055" y="1068705"/>
-                <a:chExt cx="3612572" cy="5362958"/>
+                <a:chExt cx="3723500" cy="5767346"/>
               </a:xfrm>
             </p:grpSpPr>
             <p:sp>
@@ -3468,7 +3468,7 @@
               </p:nvSpPr>
               <p:spPr>
                 <a:xfrm>
-                  <a:off x="3286124" y="6047314"/>
+                  <a:off x="3397052" y="6451702"/>
                   <a:ext cx="1655503" cy="384349"/>
                 </a:xfrm>
                 <a:prstGeom prst="rect">

</xml_diff>